<commit_message>
Update team members: delete rank and modify David's affectation
</commit_message>
<xml_diff>
--- a/about/images/equipe-leptonex.pptx
+++ b/about/images/equipe-leptonex.pptx
@@ -104,6 +104,11 @@
       </a:defRPr>
     </a:lvl9pPr>
   </p:defaultTextStyle>
+  <p:extLst>
+    <p:ext uri="{EFAFB233-063F-42B5-8137-9DF3F51BA10A}">
+      <p15:sldGuideLst xmlns:p15="http://schemas.microsoft.com/office/powerpoint/2012/main"/>
+    </p:ext>
+  </p:extLst>
 </p:presentation>
 </file>
 
@@ -254,7 +259,7 @@
           <a:p>
             <a:fld id="{6277BD84-42E0-E148-969D-0479BE8FD03A}" type="datetimeFigureOut">
               <a:rPr lang="fr-FR" smtClean="0"/>
-              <a:t>03/04/2025</a:t>
+              <a:t>09/04/2025</a:t>
             </a:fld>
             <a:endParaRPr lang="fr-FR"/>
           </a:p>
@@ -452,7 +457,7 @@
           <a:p>
             <a:fld id="{6277BD84-42E0-E148-969D-0479BE8FD03A}" type="datetimeFigureOut">
               <a:rPr lang="fr-FR" smtClean="0"/>
-              <a:t>03/04/2025</a:t>
+              <a:t>09/04/2025</a:t>
             </a:fld>
             <a:endParaRPr lang="fr-FR"/>
           </a:p>
@@ -660,7 +665,7 @@
           <a:p>
             <a:fld id="{6277BD84-42E0-E148-969D-0479BE8FD03A}" type="datetimeFigureOut">
               <a:rPr lang="fr-FR" smtClean="0"/>
-              <a:t>03/04/2025</a:t>
+              <a:t>09/04/2025</a:t>
             </a:fld>
             <a:endParaRPr lang="fr-FR"/>
           </a:p>
@@ -858,7 +863,7 @@
           <a:p>
             <a:fld id="{6277BD84-42E0-E148-969D-0479BE8FD03A}" type="datetimeFigureOut">
               <a:rPr lang="fr-FR" smtClean="0"/>
-              <a:t>03/04/2025</a:t>
+              <a:t>09/04/2025</a:t>
             </a:fld>
             <a:endParaRPr lang="fr-FR"/>
           </a:p>
@@ -1133,7 +1138,7 @@
           <a:p>
             <a:fld id="{6277BD84-42E0-E148-969D-0479BE8FD03A}" type="datetimeFigureOut">
               <a:rPr lang="fr-FR" smtClean="0"/>
-              <a:t>03/04/2025</a:t>
+              <a:t>09/04/2025</a:t>
             </a:fld>
             <a:endParaRPr lang="fr-FR"/>
           </a:p>
@@ -1398,7 +1403,7 @@
           <a:p>
             <a:fld id="{6277BD84-42E0-E148-969D-0479BE8FD03A}" type="datetimeFigureOut">
               <a:rPr lang="fr-FR" smtClean="0"/>
-              <a:t>03/04/2025</a:t>
+              <a:t>09/04/2025</a:t>
             </a:fld>
             <a:endParaRPr lang="fr-FR"/>
           </a:p>
@@ -1810,7 +1815,7 @@
           <a:p>
             <a:fld id="{6277BD84-42E0-E148-969D-0479BE8FD03A}" type="datetimeFigureOut">
               <a:rPr lang="fr-FR" smtClean="0"/>
-              <a:t>03/04/2025</a:t>
+              <a:t>09/04/2025</a:t>
             </a:fld>
             <a:endParaRPr lang="fr-FR"/>
           </a:p>
@@ -1951,7 +1956,7 @@
           <a:p>
             <a:fld id="{6277BD84-42E0-E148-969D-0479BE8FD03A}" type="datetimeFigureOut">
               <a:rPr lang="fr-FR" smtClean="0"/>
-              <a:t>03/04/2025</a:t>
+              <a:t>09/04/2025</a:t>
             </a:fld>
             <a:endParaRPr lang="fr-FR"/>
           </a:p>
@@ -2064,7 +2069,7 @@
           <a:p>
             <a:fld id="{6277BD84-42E0-E148-969D-0479BE8FD03A}" type="datetimeFigureOut">
               <a:rPr lang="fr-FR" smtClean="0"/>
-              <a:t>03/04/2025</a:t>
+              <a:t>09/04/2025</a:t>
             </a:fld>
             <a:endParaRPr lang="fr-FR"/>
           </a:p>
@@ -2375,7 +2380,7 @@
           <a:p>
             <a:fld id="{6277BD84-42E0-E148-969D-0479BE8FD03A}" type="datetimeFigureOut">
               <a:rPr lang="fr-FR" smtClean="0"/>
-              <a:t>03/04/2025</a:t>
+              <a:t>09/04/2025</a:t>
             </a:fld>
             <a:endParaRPr lang="fr-FR"/>
           </a:p>
@@ -2663,7 +2668,7 @@
           <a:p>
             <a:fld id="{6277BD84-42E0-E148-969D-0479BE8FD03A}" type="datetimeFigureOut">
               <a:rPr lang="fr-FR" smtClean="0"/>
-              <a:t>03/04/2025</a:t>
+              <a:t>09/04/2025</a:t>
             </a:fld>
             <a:endParaRPr lang="fr-FR"/>
           </a:p>
@@ -2904,7 +2909,7 @@
           <a:p>
             <a:fld id="{6277BD84-42E0-E148-969D-0479BE8FD03A}" type="datetimeFigureOut">
               <a:rPr lang="fr-FR" smtClean="0"/>
-              <a:t>03/04/2025</a:t>
+              <a:t>09/04/2025</a:t>
             </a:fld>
             <a:endParaRPr lang="fr-FR"/>
           </a:p>
@@ -3621,7 +3626,7 @@
                 <a:cs typeface="Open Sans"/>
                 <a:sym typeface="Open Sans"/>
               </a:rPr>
-              <a:t>Olivier Gimenez (DR CNRS)</a:t>
+              <a:t>Olivier Gimenez</a:t>
             </a:r>
           </a:p>
           <a:p>
@@ -3663,18 +3668,15 @@
               </a:rPr>
               <a:t>Lescureux</a:t>
             </a:r>
-            <a:r>
-              <a:rPr lang="fr-FR" sz="1200" dirty="0">
-                <a:solidFill>
-                  <a:schemeClr val="tx2"/>
-                </a:solidFill>
-                <a:latin typeface="Open Sans"/>
-                <a:ea typeface="Open Sans"/>
-                <a:cs typeface="Open Sans"/>
-                <a:sym typeface="Open Sans"/>
-              </a:rPr>
-              <a:t> (CR CNRS)</a:t>
-            </a:r>
+            <a:endParaRPr lang="fr-FR" sz="1200" dirty="0">
+              <a:solidFill>
+                <a:schemeClr val="tx2"/>
+              </a:solidFill>
+              <a:latin typeface="Open Sans"/>
+              <a:ea typeface="Open Sans"/>
+              <a:cs typeface="Open Sans"/>
+              <a:sym typeface="Open Sans"/>
+            </a:endParaRPr>
           </a:p>
           <a:p>
             <a:pPr indent="457200">
@@ -3701,7 +3703,7 @@
                 <a:cs typeface="Open Sans"/>
                 <a:sym typeface="Open Sans"/>
               </a:rPr>
-              <a:t>Romain Duda (CR CNRS)</a:t>
+              <a:t>Romain Duda</a:t>
             </a:r>
           </a:p>
           <a:p>
@@ -3743,18 +3745,15 @@
               </a:rPr>
               <a:t>Mathevet</a:t>
             </a:r>
-            <a:r>
-              <a:rPr lang="fr-FR" sz="1200" dirty="0">
-                <a:solidFill>
-                  <a:schemeClr val="tx2"/>
-                </a:solidFill>
-                <a:latin typeface="Open Sans"/>
-                <a:ea typeface="Open Sans"/>
-                <a:cs typeface="Open Sans"/>
-                <a:sym typeface="Open Sans"/>
-              </a:rPr>
-              <a:t> (DR CNRS)</a:t>
-            </a:r>
+            <a:endParaRPr lang="fr-FR" sz="1200" dirty="0">
+              <a:solidFill>
+                <a:schemeClr val="tx2"/>
+              </a:solidFill>
+              <a:latin typeface="Open Sans"/>
+              <a:ea typeface="Open Sans"/>
+              <a:cs typeface="Open Sans"/>
+              <a:sym typeface="Open Sans"/>
+            </a:endParaRPr>
           </a:p>
           <a:p>
             <a:pPr indent="457200">
@@ -3781,7 +3780,7 @@
                 <a:cs typeface="Open Sans"/>
                 <a:sym typeface="Open Sans"/>
               </a:rPr>
-              <a:t>Anne Charpentier (MCF UM)</a:t>
+              <a:t>Anne Charpentier</a:t>
             </a:r>
           </a:p>
           <a:p>
@@ -3809,7 +3808,7 @@
                 <a:cs typeface="Open Sans"/>
                 <a:sym typeface="Open Sans"/>
               </a:rPr>
-              <a:t>Samuel Perret (AI CNRS)</a:t>
+              <a:t>Samuel Perret</a:t>
             </a:r>
           </a:p>
           <a:p>
@@ -3835,7 +3834,7 @@
                 <a:cs typeface="Open Sans"/>
                 <a:sym typeface="Open Sans"/>
               </a:rPr>
-              <a:t>Christophe de Franceschi (AI CNRS)</a:t>
+              <a:t>Christophe de Franceschi</a:t>
             </a:r>
           </a:p>
           <a:p>
@@ -3861,7 +3860,7 @@
                 <a:cs typeface="Open Sans"/>
                 <a:sym typeface="Open Sans"/>
               </a:rPr>
-              <a:t>Annick Lucas (AI CNRS)</a:t>
+              <a:t>Annick Lucas</a:t>
             </a:r>
           </a:p>
           <a:p>
@@ -3887,7 +3886,7 @@
                 <a:cs typeface="Open Sans"/>
                 <a:sym typeface="Open Sans"/>
               </a:rPr>
-              <a:t>Camille Mottier (M2)</a:t>
+              <a:t>Camille Mottier</a:t>
             </a:r>
           </a:p>
           <a:p>
@@ -3913,7 +3912,7 @@
                 <a:cs typeface="Open Sans"/>
                 <a:sym typeface="Open Sans"/>
               </a:rPr>
-              <a:t>Lucie Develay Nguyen (M2)</a:t>
+              <a:t>Lucie Develay Nguyen</a:t>
             </a:r>
           </a:p>
           <a:p>
@@ -4017,7 +4016,7 @@
                 <a:cs typeface="Open Sans"/>
                 <a:sym typeface="Open Sans"/>
               </a:rPr>
-              <a:t>Nathalie Charbonnel (DR INRAE)</a:t>
+              <a:t>Nathalie Charbonnel</a:t>
             </a:r>
           </a:p>
           <a:p>
@@ -4045,7 +4044,7 @@
                 <a:cs typeface="Open Sans"/>
                 <a:sym typeface="Open Sans"/>
               </a:rPr>
-              <a:t>Guillaume Castel (CR INRAE)</a:t>
+              <a:t>Guillaume Castel</a:t>
             </a:r>
           </a:p>
           <a:p>
@@ -4073,7 +4072,7 @@
                 <a:cs typeface="Open Sans"/>
                 <a:sym typeface="Open Sans"/>
               </a:rPr>
-              <a:t>Karine Berthier (CR INRAE)</a:t>
+              <a:t>Karine Berthier</a:t>
             </a:r>
           </a:p>
           <a:p>
@@ -4115,18 +4114,15 @@
               </a:rPr>
               <a:t>Galan</a:t>
             </a:r>
-            <a:r>
-              <a:rPr lang="fr-FR" sz="1200" dirty="0">
-                <a:solidFill>
-                  <a:schemeClr val="tx2"/>
-                </a:solidFill>
-                <a:latin typeface="Open Sans"/>
-                <a:ea typeface="Open Sans"/>
-                <a:cs typeface="Open Sans"/>
-                <a:sym typeface="Open Sans"/>
-              </a:rPr>
-              <a:t> (IR INRAE)</a:t>
-            </a:r>
+            <a:endParaRPr lang="fr-FR" sz="1200" dirty="0">
+              <a:solidFill>
+                <a:schemeClr val="tx2"/>
+              </a:solidFill>
+              <a:latin typeface="Open Sans"/>
+              <a:ea typeface="Open Sans"/>
+              <a:cs typeface="Open Sans"/>
+              <a:sym typeface="Open Sans"/>
+            </a:endParaRPr>
           </a:p>
           <a:p>
             <a:pPr marL="450000">
@@ -4167,18 +4163,15 @@
               </a:rPr>
               <a:t>Piry</a:t>
             </a:r>
-            <a:r>
-              <a:rPr lang="fr-FR" sz="1200" dirty="0">
-                <a:solidFill>
-                  <a:schemeClr val="tx2"/>
-                </a:solidFill>
-                <a:latin typeface="Open Sans"/>
-                <a:ea typeface="Open Sans"/>
-                <a:cs typeface="Open Sans"/>
-                <a:sym typeface="Open Sans"/>
-              </a:rPr>
-              <a:t> (IR INRAE)</a:t>
-            </a:r>
+            <a:endParaRPr lang="fr-FR" sz="1200" dirty="0">
+              <a:solidFill>
+                <a:schemeClr val="tx2"/>
+              </a:solidFill>
+              <a:latin typeface="Open Sans"/>
+              <a:ea typeface="Open Sans"/>
+              <a:cs typeface="Open Sans"/>
+              <a:sym typeface="Open Sans"/>
+            </a:endParaRPr>
           </a:p>
           <a:p>
             <a:pPr marL="450000">
@@ -4205,7 +4198,7 @@
                 <a:cs typeface="Open Sans"/>
                 <a:sym typeface="Open Sans"/>
               </a:rPr>
-              <a:t>Philippe Gauthier (IE IRD)</a:t>
+              <a:t>Philippe Gauthier</a:t>
             </a:r>
           </a:p>
           <a:p>
@@ -4247,18 +4240,15 @@
               </a:rPr>
               <a:t>Artige</a:t>
             </a:r>
-            <a:r>
-              <a:rPr lang="fr-FR" sz="1200" dirty="0">
-                <a:solidFill>
-                  <a:schemeClr val="tx2"/>
-                </a:solidFill>
-                <a:latin typeface="Open Sans"/>
-                <a:ea typeface="Open Sans"/>
-                <a:cs typeface="Open Sans"/>
-                <a:sym typeface="Open Sans"/>
-              </a:rPr>
-              <a:t> (IE INRAE)</a:t>
-            </a:r>
+            <a:endParaRPr lang="fr-FR" sz="1200" dirty="0">
+              <a:solidFill>
+                <a:schemeClr val="tx2"/>
+              </a:solidFill>
+              <a:latin typeface="Open Sans"/>
+              <a:ea typeface="Open Sans"/>
+              <a:cs typeface="Open Sans"/>
+              <a:sym typeface="Open Sans"/>
+            </a:endParaRPr>
           </a:p>
           <a:p>
             <a:pPr marL="450000">
@@ -4285,7 +4275,7 @@
                 <a:cs typeface="Open Sans"/>
                 <a:sym typeface="Open Sans"/>
               </a:rPr>
-              <a:t>Anne Loiseau (TR INRAE)</a:t>
+              <a:t>Anne Loiseau</a:t>
             </a:r>
           </a:p>
           <a:p>
@@ -4327,18 +4317,15 @@
               </a:rPr>
               <a:t>Tatard</a:t>
             </a:r>
-            <a:r>
-              <a:rPr lang="fr-FR" sz="1200" dirty="0">
-                <a:solidFill>
-                  <a:schemeClr val="tx2"/>
-                </a:solidFill>
-                <a:latin typeface="Open Sans"/>
-                <a:ea typeface="Open Sans"/>
-                <a:cs typeface="Open Sans"/>
-                <a:sym typeface="Open Sans"/>
-              </a:rPr>
-              <a:t> (TR INRAE)</a:t>
-            </a:r>
+            <a:endParaRPr lang="fr-FR" sz="1200" dirty="0">
+              <a:solidFill>
+                <a:schemeClr val="tx2"/>
+              </a:solidFill>
+              <a:latin typeface="Open Sans"/>
+              <a:ea typeface="Open Sans"/>
+              <a:cs typeface="Open Sans"/>
+              <a:sym typeface="Open Sans"/>
+            </a:endParaRPr>
           </a:p>
           <a:p>
             <a:pPr marL="450000">
@@ -4365,7 +4352,7 @@
                 <a:cs typeface="Open Sans"/>
                 <a:sym typeface="Open Sans"/>
               </a:rPr>
-              <a:t>Julien Pradel (TR INRAE)</a:t>
+              <a:t>Julien Pradel</a:t>
             </a:r>
           </a:p>
           <a:p>
@@ -4460,18 +4447,15 @@
               </a:rPr>
               <a:t>Benavides</a:t>
             </a:r>
-            <a:r>
-              <a:rPr lang="fr-FR" sz="1200" dirty="0">
-                <a:solidFill>
-                  <a:schemeClr val="tx2"/>
-                </a:solidFill>
-                <a:latin typeface="Open Sans"/>
-                <a:ea typeface="Open Sans"/>
-                <a:cs typeface="Open Sans"/>
-                <a:sym typeface="Open Sans"/>
-              </a:rPr>
-              <a:t> (DR IRD)</a:t>
-            </a:r>
+            <a:endParaRPr lang="fr-FR" sz="1200" dirty="0">
+              <a:solidFill>
+                <a:schemeClr val="tx2"/>
+              </a:solidFill>
+              <a:latin typeface="Open Sans"/>
+              <a:ea typeface="Open Sans"/>
+              <a:cs typeface="Open Sans"/>
+              <a:sym typeface="Open Sans"/>
+            </a:endParaRPr>
           </a:p>
         </p:txBody>
       </p:sp>
@@ -4491,8 +4475,8 @@
         </p:nvSpPr>
         <p:spPr>
           <a:xfrm>
-            <a:off x="5739048" y="1135229"/>
-            <a:ext cx="5668650" cy="5410199"/>
+            <a:off x="5739047" y="1135229"/>
+            <a:ext cx="6050181" cy="5410199"/>
           </a:xfrm>
           <a:prstGeom prst="rect">
             <a:avLst/>
@@ -4897,7 +4881,7 @@
                 <a:cs typeface="Open Sans"/>
                 <a:sym typeface="Open Sans"/>
               </a:rPr>
-              <a:t>, Direction Nature, Agroécologie et Paysage</a:t>
+              <a:t>, Pôle Biodiversité Paysages Agroécologie et Alimentation</a:t>
             </a:r>
           </a:p>
           <a:p>

</xml_diff>